<commit_message>
add pictures and slight change to ppt
add pics and slight change to ppt
</commit_message>
<xml_diff>
--- a/Diederich_Grassi_Nichols_PPT.pptx
+++ b/Diederich_Grassi_Nichols_PPT.pptx
@@ -6609,7 +6609,6 @@
               <a:rPr lang="en-US" dirty="0" smtClean="0"/>
               <a:t>Agenda</a:t>
             </a:r>
-            <a:endParaRPr lang="en-US" dirty="0" smtClean="0"/>
           </a:p>
           <a:p>
             <a:endParaRPr lang="en-US" dirty="0"/>
@@ -6853,15 +6852,7 @@
             </a:r>
             <a:r>
               <a:rPr lang="en-US" dirty="0" smtClean="0"/>
-              <a:t> built-in </a:t>
-            </a:r>
-            <a:r>
-              <a:rPr lang="en-US" dirty="0" smtClean="0"/>
-              <a:t>method is </a:t>
-            </a:r>
-            <a:r>
-              <a:rPr lang="en-US" dirty="0" smtClean="0"/>
-              <a:t>based on</a:t>
+              <a:t> built-in method is based on</a:t>
             </a:r>
           </a:p>
           <a:p>
@@ -6989,8 +6980,17 @@
             </a:r>
             <a:r>
               <a:rPr lang="en-US" dirty="0" smtClean="0"/>
-              <a:t>: Achieving signal from the convolution of signal, background and Poisson noise)</a:t>
-            </a:r>
+              <a:t>: Achieving signal from the convolution of signal, background and </a:t>
+            </a:r>
+            <a:r>
+              <a:rPr lang="en-US" smtClean="0"/>
+              <a:t>Poisson </a:t>
+            </a:r>
+            <a:r>
+              <a:rPr lang="en-US" smtClean="0"/>
+              <a:t>noise</a:t>
+            </a:r>
+            <a:endParaRPr lang="en-US" dirty="0" smtClean="0"/>
           </a:p>
           <a:p>
             <a:pPr lvl="1"/>
@@ -7076,11 +7076,7 @@
           <a:p>
             <a:r>
               <a:rPr lang="en-US" dirty="0" smtClean="0"/>
-              <a:t>*function and variable </a:t>
-            </a:r>
-            <a:r>
-              <a:rPr lang="en-US" dirty="0" smtClean="0"/>
-              <a:t>definitions*</a:t>
+              <a:t>*function and variable definitions*</a:t>
             </a:r>
           </a:p>
           <a:p>

</xml_diff>